<commit_message>
Inclusão de projetos do eixo 1 de 2023_1
</commit_message>
<xml_diff>
--- a/Eixo1/Portifólio de Projetos Eixo 1.pptx
+++ b/Eixo1/Portifólio de Projetos Eixo 1.pptx
@@ -697,7 +697,7 @@
           <a:p>
             <a:fld id="{60CECE5B-D585-4F7F-B79B-C88EA4113D86}" type="datetimeFigureOut">
               <a:rPr lang="pt-BR" smtClean="0"/>
-              <a:t>10/04/2024</a:t>
+              <a:t>12/04/2024</a:t>
             </a:fld>
             <a:endParaRPr lang="pt-BR"/>
           </a:p>
@@ -1198,7 +1198,7 @@
           <a:p>
             <a:fld id="{A25312C7-32D4-4D62-B30D-831BB99699BC}" type="datetimeFigureOut">
               <a:rPr lang="pt-BR" smtClean="0"/>
-              <a:t>10/04/2024</a:t>
+              <a:t>12/04/2024</a:t>
             </a:fld>
             <a:endParaRPr lang="pt-BR"/>
           </a:p>
@@ -1398,7 +1398,7 @@
           <a:p>
             <a:fld id="{A25312C7-32D4-4D62-B30D-831BB99699BC}" type="datetimeFigureOut">
               <a:rPr lang="pt-BR" smtClean="0"/>
-              <a:t>10/04/2024</a:t>
+              <a:t>12/04/2024</a:t>
             </a:fld>
             <a:endParaRPr lang="pt-BR"/>
           </a:p>
@@ -1608,7 +1608,7 @@
           <a:p>
             <a:fld id="{A25312C7-32D4-4D62-B30D-831BB99699BC}" type="datetimeFigureOut">
               <a:rPr lang="pt-BR" smtClean="0"/>
-              <a:t>10/04/2024</a:t>
+              <a:t>12/04/2024</a:t>
             </a:fld>
             <a:endParaRPr lang="pt-BR"/>
           </a:p>
@@ -1808,7 +1808,7 @@
           <a:p>
             <a:fld id="{A25312C7-32D4-4D62-B30D-831BB99699BC}" type="datetimeFigureOut">
               <a:rPr lang="pt-BR" smtClean="0"/>
-              <a:t>10/04/2024</a:t>
+              <a:t>12/04/2024</a:t>
             </a:fld>
             <a:endParaRPr lang="pt-BR"/>
           </a:p>
@@ -2084,7 +2084,7 @@
           <a:p>
             <a:fld id="{A25312C7-32D4-4D62-B30D-831BB99699BC}" type="datetimeFigureOut">
               <a:rPr lang="pt-BR" smtClean="0"/>
-              <a:t>10/04/2024</a:t>
+              <a:t>12/04/2024</a:t>
             </a:fld>
             <a:endParaRPr lang="pt-BR"/>
           </a:p>
@@ -2352,7 +2352,7 @@
           <a:p>
             <a:fld id="{A25312C7-32D4-4D62-B30D-831BB99699BC}" type="datetimeFigureOut">
               <a:rPr lang="pt-BR" smtClean="0"/>
-              <a:t>10/04/2024</a:t>
+              <a:t>12/04/2024</a:t>
             </a:fld>
             <a:endParaRPr lang="pt-BR"/>
           </a:p>
@@ -2767,7 +2767,7 @@
           <a:p>
             <a:fld id="{A25312C7-32D4-4D62-B30D-831BB99699BC}" type="datetimeFigureOut">
               <a:rPr lang="pt-BR" smtClean="0"/>
-              <a:t>10/04/2024</a:t>
+              <a:t>12/04/2024</a:t>
             </a:fld>
             <a:endParaRPr lang="pt-BR"/>
           </a:p>
@@ -2909,7 +2909,7 @@
           <a:p>
             <a:fld id="{A25312C7-32D4-4D62-B30D-831BB99699BC}" type="datetimeFigureOut">
               <a:rPr lang="pt-BR" smtClean="0"/>
-              <a:t>10/04/2024</a:t>
+              <a:t>12/04/2024</a:t>
             </a:fld>
             <a:endParaRPr lang="pt-BR"/>
           </a:p>
@@ -3022,7 +3022,7 @@
           <a:p>
             <a:fld id="{A25312C7-32D4-4D62-B30D-831BB99699BC}" type="datetimeFigureOut">
               <a:rPr lang="pt-BR" smtClean="0"/>
-              <a:t>10/04/2024</a:t>
+              <a:t>12/04/2024</a:t>
             </a:fld>
             <a:endParaRPr lang="pt-BR"/>
           </a:p>
@@ -3335,7 +3335,7 @@
           <a:p>
             <a:fld id="{A25312C7-32D4-4D62-B30D-831BB99699BC}" type="datetimeFigureOut">
               <a:rPr lang="pt-BR" smtClean="0"/>
-              <a:t>10/04/2024</a:t>
+              <a:t>12/04/2024</a:t>
             </a:fld>
             <a:endParaRPr lang="pt-BR"/>
           </a:p>
@@ -3624,7 +3624,7 @@
           <a:p>
             <a:fld id="{A25312C7-32D4-4D62-B30D-831BB99699BC}" type="datetimeFigureOut">
               <a:rPr lang="pt-BR" smtClean="0"/>
-              <a:t>10/04/2024</a:t>
+              <a:t>12/04/2024</a:t>
             </a:fld>
             <a:endParaRPr lang="pt-BR"/>
           </a:p>
@@ -3870,7 +3870,7 @@
           <a:p>
             <a:fld id="{A25312C7-32D4-4D62-B30D-831BB99699BC}" type="datetimeFigureOut">
               <a:rPr lang="pt-BR" smtClean="0"/>
-              <a:t>10/04/2024</a:t>
+              <a:t>12/04/2024</a:t>
             </a:fld>
             <a:endParaRPr lang="pt-BR"/>
           </a:p>
@@ -4289,10 +4289,10 @@
       </p:grpSpPr>
       <p:sp>
         <p:nvSpPr>
-          <p:cNvPr id="24" name="Subtitle 2">
-            <a:extLst>
-              <a:ext uri="{FF2B5EF4-FFF2-40B4-BE49-F238E27FC236}">
-                <a16:creationId xmlns:a16="http://schemas.microsoft.com/office/drawing/2014/main" id="{91293A9D-0145-0D16-BADD-B959604FE69A}"/>
+          <p:cNvPr id="9" name="Subtitle 2">
+            <a:extLst>
+              <a:ext uri="{FF2B5EF4-FFF2-40B4-BE49-F238E27FC236}">
+                <a16:creationId xmlns:a16="http://schemas.microsoft.com/office/drawing/2014/main" id="{E46C5D3A-D6AA-FFD3-B1FC-0C8CDCEE6038}"/>
               </a:ext>
             </a:extLst>
           </p:cNvPr>
@@ -4303,8 +4303,8 @@
         </p:nvSpPr>
         <p:spPr>
           <a:xfrm>
-            <a:off x="3121696" y="2887686"/>
-            <a:ext cx="2622176" cy="2787207"/>
+            <a:off x="497923" y="1493920"/>
+            <a:ext cx="2622176" cy="1320708"/>
           </a:xfrm>
           <a:prstGeom prst="rect">
             <a:avLst/>
@@ -4314,7 +4314,7 @@
           </a:solidFill>
         </p:spPr>
         <p:txBody>
-          <a:bodyPr vert="horz" lIns="91440" tIns="45720" rIns="91440" bIns="45720" rtlCol="0">
+          <a:bodyPr vert="horz" lIns="91440" tIns="216000" rIns="91440" bIns="45720" rtlCol="0">
             <a:normAutofit/>
           </a:bodyPr>
           <a:lstStyle>
@@ -4482,20 +4482,23 @@
             </a:lvl9pPr>
           </a:lstStyle>
           <a:p>
-            <a:endParaRPr lang="pt-BR" dirty="0">
-              <a:solidFill>
-                <a:srgbClr val="E1507D"/>
-              </a:solidFill>
-            </a:endParaRPr>
-          </a:p>
-        </p:txBody>
-      </p:sp>
-      <p:sp>
-        <p:nvSpPr>
-          <p:cNvPr id="9" name="Subtitle 2">
-            <a:extLst>
-              <a:ext uri="{FF2B5EF4-FFF2-40B4-BE49-F238E27FC236}">
-                <a16:creationId xmlns:a16="http://schemas.microsoft.com/office/drawing/2014/main" id="{E46C5D3A-D6AA-FFD3-B1FC-0C8CDCEE6038}"/>
+            <a:r>
+              <a:rPr lang="pt-BR" dirty="0">
+                <a:solidFill>
+                  <a:srgbClr val="E1507D"/>
+                </a:solidFill>
+              </a:rPr>
+              <a:t>2023.2</a:t>
+            </a:r>
+          </a:p>
+        </p:txBody>
+      </p:sp>
+      <p:sp>
+        <p:nvSpPr>
+          <p:cNvPr id="15" name="Subtitle 2">
+            <a:extLst>
+              <a:ext uri="{FF2B5EF4-FFF2-40B4-BE49-F238E27FC236}">
+                <a16:creationId xmlns:a16="http://schemas.microsoft.com/office/drawing/2014/main" id="{30587390-DBCC-B4D6-E90A-B65F76D5E328}"/>
               </a:ext>
             </a:extLst>
           </p:cNvPr>
@@ -4506,8 +4509,8 @@
         </p:nvSpPr>
         <p:spPr>
           <a:xfrm>
-            <a:off x="497923" y="1493920"/>
-            <a:ext cx="2622176" cy="1320708"/>
+            <a:off x="494707" y="2887686"/>
+            <a:ext cx="2622176" cy="2787207"/>
           </a:xfrm>
           <a:prstGeom prst="rect">
             <a:avLst/>
@@ -4517,7 +4520,7 @@
           </a:solidFill>
         </p:spPr>
         <p:txBody>
-          <a:bodyPr vert="horz" lIns="91440" tIns="216000" rIns="91440" bIns="45720" rtlCol="0">
+          <a:bodyPr vert="horz" lIns="91440" tIns="45720" rIns="91440" bIns="45720" rtlCol="0">
             <a:normAutofit/>
           </a:bodyPr>
           <a:lstStyle>
@@ -4685,220 +4688,6 @@
             </a:lvl9pPr>
           </a:lstStyle>
           <a:p>
-            <a:r>
-              <a:rPr lang="pt-BR">
-                <a:solidFill>
-                  <a:srgbClr val="E1507D"/>
-                </a:solidFill>
-              </a:rPr>
-              <a:t>2023.</a:t>
-            </a:r>
-            <a:r>
-              <a:rPr lang="pt-BR" dirty="0">
-                <a:solidFill>
-                  <a:srgbClr val="E1507D"/>
-                </a:solidFill>
-              </a:rPr>
-              <a:t>1</a:t>
-            </a:r>
-          </a:p>
-        </p:txBody>
-      </p:sp>
-      <p:sp>
-        <p:nvSpPr>
-          <p:cNvPr id="15" name="Subtitle 2">
-            <a:extLst>
-              <a:ext uri="{FF2B5EF4-FFF2-40B4-BE49-F238E27FC236}">
-                <a16:creationId xmlns:a16="http://schemas.microsoft.com/office/drawing/2014/main" id="{30587390-DBCC-B4D6-E90A-B65F76D5E328}"/>
-              </a:ext>
-            </a:extLst>
-          </p:cNvPr>
-          <p:cNvSpPr txBox="1">
-            <a:spLocks/>
-          </p:cNvSpPr>
-          <p:nvPr/>
-        </p:nvSpPr>
-        <p:spPr>
-          <a:xfrm>
-            <a:off x="494707" y="2887686"/>
-            <a:ext cx="2622176" cy="2787207"/>
-          </a:xfrm>
-          <a:prstGeom prst="rect">
-            <a:avLst/>
-          </a:prstGeom>
-          <a:solidFill>
-            <a:srgbClr val="E4E8EB"/>
-          </a:solidFill>
-        </p:spPr>
-        <p:txBody>
-          <a:bodyPr vert="horz" lIns="91440" tIns="45720" rIns="91440" bIns="45720" rtlCol="0">
-            <a:normAutofit/>
-          </a:bodyPr>
-          <a:lstStyle>
-            <a:lvl1pPr marL="0" indent="0" algn="ctr" defTabSz="914400" rtl="0" eaLnBrk="1" latinLnBrk="0" hangingPunct="1">
-              <a:lnSpc>
-                <a:spcPct val="90000"/>
-              </a:lnSpc>
-              <a:spcBef>
-                <a:spcPts val="1000"/>
-              </a:spcBef>
-              <a:buFont typeface="Arial" panose="020B0604020202020204" pitchFamily="34" charset="0"/>
-              <a:buNone/>
-              <a:defRPr sz="2400" kern="1200">
-                <a:solidFill>
-                  <a:schemeClr val="tx1"/>
-                </a:solidFill>
-                <a:latin typeface="+mn-lt"/>
-                <a:ea typeface="+mn-ea"/>
-                <a:cs typeface="+mn-cs"/>
-              </a:defRPr>
-            </a:lvl1pPr>
-            <a:lvl2pPr marL="457200" indent="0" algn="ctr" defTabSz="914400" rtl="0" eaLnBrk="1" latinLnBrk="0" hangingPunct="1">
-              <a:lnSpc>
-                <a:spcPct val="90000"/>
-              </a:lnSpc>
-              <a:spcBef>
-                <a:spcPts val="500"/>
-              </a:spcBef>
-              <a:buFont typeface="Arial" panose="020B0604020202020204" pitchFamily="34" charset="0"/>
-              <a:buNone/>
-              <a:defRPr sz="2000" kern="1200">
-                <a:solidFill>
-                  <a:schemeClr val="tx1"/>
-                </a:solidFill>
-                <a:latin typeface="+mn-lt"/>
-                <a:ea typeface="+mn-ea"/>
-                <a:cs typeface="+mn-cs"/>
-              </a:defRPr>
-            </a:lvl2pPr>
-            <a:lvl3pPr marL="914400" indent="0" algn="ctr" defTabSz="914400" rtl="0" eaLnBrk="1" latinLnBrk="0" hangingPunct="1">
-              <a:lnSpc>
-                <a:spcPct val="90000"/>
-              </a:lnSpc>
-              <a:spcBef>
-                <a:spcPts val="500"/>
-              </a:spcBef>
-              <a:buFont typeface="Arial" panose="020B0604020202020204" pitchFamily="34" charset="0"/>
-              <a:buNone/>
-              <a:defRPr sz="1800" kern="1200">
-                <a:solidFill>
-                  <a:schemeClr val="tx1"/>
-                </a:solidFill>
-                <a:latin typeface="+mn-lt"/>
-                <a:ea typeface="+mn-ea"/>
-                <a:cs typeface="+mn-cs"/>
-              </a:defRPr>
-            </a:lvl3pPr>
-            <a:lvl4pPr marL="1371600" indent="0" algn="ctr" defTabSz="914400" rtl="0" eaLnBrk="1" latinLnBrk="0" hangingPunct="1">
-              <a:lnSpc>
-                <a:spcPct val="90000"/>
-              </a:lnSpc>
-              <a:spcBef>
-                <a:spcPts val="500"/>
-              </a:spcBef>
-              <a:buFont typeface="Arial" panose="020B0604020202020204" pitchFamily="34" charset="0"/>
-              <a:buNone/>
-              <a:defRPr sz="1600" kern="1200">
-                <a:solidFill>
-                  <a:schemeClr val="tx1"/>
-                </a:solidFill>
-                <a:latin typeface="+mn-lt"/>
-                <a:ea typeface="+mn-ea"/>
-                <a:cs typeface="+mn-cs"/>
-              </a:defRPr>
-            </a:lvl4pPr>
-            <a:lvl5pPr marL="1828800" indent="0" algn="ctr" defTabSz="914400" rtl="0" eaLnBrk="1" latinLnBrk="0" hangingPunct="1">
-              <a:lnSpc>
-                <a:spcPct val="90000"/>
-              </a:lnSpc>
-              <a:spcBef>
-                <a:spcPts val="500"/>
-              </a:spcBef>
-              <a:buFont typeface="Arial" panose="020B0604020202020204" pitchFamily="34" charset="0"/>
-              <a:buNone/>
-              <a:defRPr sz="1600" kern="1200">
-                <a:solidFill>
-                  <a:schemeClr val="tx1"/>
-                </a:solidFill>
-                <a:latin typeface="+mn-lt"/>
-                <a:ea typeface="+mn-ea"/>
-                <a:cs typeface="+mn-cs"/>
-              </a:defRPr>
-            </a:lvl5pPr>
-            <a:lvl6pPr marL="2286000" indent="0" algn="ctr" defTabSz="914400" rtl="0" eaLnBrk="1" latinLnBrk="0" hangingPunct="1">
-              <a:lnSpc>
-                <a:spcPct val="90000"/>
-              </a:lnSpc>
-              <a:spcBef>
-                <a:spcPts val="500"/>
-              </a:spcBef>
-              <a:buFont typeface="Arial" panose="020B0604020202020204" pitchFamily="34" charset="0"/>
-              <a:buNone/>
-              <a:defRPr sz="1600" kern="1200">
-                <a:solidFill>
-                  <a:schemeClr val="tx1"/>
-                </a:solidFill>
-                <a:latin typeface="+mn-lt"/>
-                <a:ea typeface="+mn-ea"/>
-                <a:cs typeface="+mn-cs"/>
-              </a:defRPr>
-            </a:lvl6pPr>
-            <a:lvl7pPr marL="2743200" indent="0" algn="ctr" defTabSz="914400" rtl="0" eaLnBrk="1" latinLnBrk="0" hangingPunct="1">
-              <a:lnSpc>
-                <a:spcPct val="90000"/>
-              </a:lnSpc>
-              <a:spcBef>
-                <a:spcPts val="500"/>
-              </a:spcBef>
-              <a:buFont typeface="Arial" panose="020B0604020202020204" pitchFamily="34" charset="0"/>
-              <a:buNone/>
-              <a:defRPr sz="1600" kern="1200">
-                <a:solidFill>
-                  <a:schemeClr val="tx1"/>
-                </a:solidFill>
-                <a:latin typeface="+mn-lt"/>
-                <a:ea typeface="+mn-ea"/>
-                <a:cs typeface="+mn-cs"/>
-              </a:defRPr>
-            </a:lvl7pPr>
-            <a:lvl8pPr marL="3200400" indent="0" algn="ctr" defTabSz="914400" rtl="0" eaLnBrk="1" latinLnBrk="0" hangingPunct="1">
-              <a:lnSpc>
-                <a:spcPct val="90000"/>
-              </a:lnSpc>
-              <a:spcBef>
-                <a:spcPts val="500"/>
-              </a:spcBef>
-              <a:buFont typeface="Arial" panose="020B0604020202020204" pitchFamily="34" charset="0"/>
-              <a:buNone/>
-              <a:defRPr sz="1600" kern="1200">
-                <a:solidFill>
-                  <a:schemeClr val="tx1"/>
-                </a:solidFill>
-                <a:latin typeface="+mn-lt"/>
-                <a:ea typeface="+mn-ea"/>
-                <a:cs typeface="+mn-cs"/>
-              </a:defRPr>
-            </a:lvl8pPr>
-            <a:lvl9pPr marL="3657600" indent="0" algn="ctr" defTabSz="914400" rtl="0" eaLnBrk="1" latinLnBrk="0" hangingPunct="1">
-              <a:lnSpc>
-                <a:spcPct val="90000"/>
-              </a:lnSpc>
-              <a:spcBef>
-                <a:spcPts val="500"/>
-              </a:spcBef>
-              <a:buFont typeface="Arial" panose="020B0604020202020204" pitchFamily="34" charset="0"/>
-              <a:buNone/>
-              <a:defRPr sz="1600" kern="1200">
-                <a:solidFill>
-                  <a:schemeClr val="tx1"/>
-                </a:solidFill>
-                <a:latin typeface="+mn-lt"/>
-                <a:ea typeface="+mn-ea"/>
-                <a:cs typeface="+mn-cs"/>
-              </a:defRPr>
-            </a:lvl9pPr>
-          </a:lstStyle>
-          <a:p>
             <a:endParaRPr lang="pt-BR" dirty="0">
               <a:solidFill>
                 <a:srgbClr val="E1507D"/>
@@ -4907,49 +4696,6 @@
           </a:p>
         </p:txBody>
       </p:sp>
-      <p:cxnSp>
-        <p:nvCxnSpPr>
-          <p:cNvPr id="19" name="Straight Connector 18">
-            <a:extLst>
-              <a:ext uri="{FF2B5EF4-FFF2-40B4-BE49-F238E27FC236}">
-                <a16:creationId xmlns:a16="http://schemas.microsoft.com/office/drawing/2014/main" id="{1F05F5CB-AE2A-6B61-588C-FD7D457F16EC}"/>
-              </a:ext>
-            </a:extLst>
-          </p:cNvPr>
-          <p:cNvCxnSpPr>
-            <a:cxnSpLocks/>
-          </p:cNvCxnSpPr>
-          <p:nvPr/>
-        </p:nvCxnSpPr>
-        <p:spPr>
-          <a:xfrm>
-            <a:off x="3114339" y="2969729"/>
-            <a:ext cx="0" cy="2520000"/>
-          </a:xfrm>
-          <a:prstGeom prst="line">
-            <a:avLst/>
-          </a:prstGeom>
-          <a:ln w="57150">
-            <a:solidFill>
-              <a:srgbClr val="F2F6F6"/>
-            </a:solidFill>
-          </a:ln>
-        </p:spPr>
-        <p:style>
-          <a:lnRef idx="2">
-            <a:schemeClr val="accent1"/>
-          </a:lnRef>
-          <a:fillRef idx="0">
-            <a:schemeClr val="accent1"/>
-          </a:fillRef>
-          <a:effectRef idx="1">
-            <a:schemeClr val="accent1"/>
-          </a:effectRef>
-          <a:fontRef idx="minor">
-            <a:schemeClr val="tx1"/>
-          </a:fontRef>
-        </p:style>
-      </p:cxnSp>
       <p:sp>
         <p:nvSpPr>
           <p:cNvPr id="20" name="TextBox 19">
@@ -5251,7 +4997,7 @@
         <p:spPr>
           <a:xfrm>
             <a:off x="758172" y="3304786"/>
-            <a:ext cx="1184940" cy="461665"/>
+            <a:ext cx="1247456" cy="461665"/>
           </a:xfrm>
           <a:prstGeom prst="rect">
             <a:avLst/>
@@ -5259,7 +5005,7 @@
           <a:noFill/>
         </p:spPr>
         <p:txBody>
-          <a:bodyPr wrap="none" rtlCol="0">
+          <a:bodyPr wrap="square" rtlCol="0">
             <a:spAutoFit/>
           </a:bodyPr>
           <a:lstStyle/>
@@ -5295,8 +5041,8 @@
         </p:nvSpPr>
         <p:spPr>
           <a:xfrm>
-            <a:off x="758172" y="3768064"/>
-            <a:ext cx="1247457" cy="461665"/>
+            <a:off x="758173" y="3745829"/>
+            <a:ext cx="1247456" cy="461665"/>
           </a:xfrm>
           <a:prstGeom prst="rect">
             <a:avLst/>
@@ -5304,7 +5050,52 @@
           <a:noFill/>
         </p:spPr>
         <p:txBody>
-          <a:bodyPr wrap="none" rtlCol="0">
+          <a:bodyPr wrap="square" rtlCol="0">
+            <a:spAutoFit/>
+          </a:bodyPr>
+          <a:lstStyle/>
+          <a:p>
+            <a:r>
+              <a:rPr lang="pt-BR" sz="2400" dirty="0">
+                <a:solidFill>
+                  <a:srgbClr val="0D1F2D"/>
+                </a:solidFill>
+                <a:hlinkClick r:id="rId3"/>
+              </a:rPr>
+              <a:t>Grupo 2</a:t>
+            </a:r>
+            <a:endParaRPr lang="pt-BR" sz="2400" dirty="0">
+              <a:solidFill>
+                <a:srgbClr val="0D1F2D"/>
+              </a:solidFill>
+            </a:endParaRPr>
+          </a:p>
+        </p:txBody>
+      </p:sp>
+      <p:sp>
+        <p:nvSpPr>
+          <p:cNvPr id="26" name="TextBox 25">
+            <a:extLst>
+              <a:ext uri="{FF2B5EF4-FFF2-40B4-BE49-F238E27FC236}">
+                <a16:creationId xmlns:a16="http://schemas.microsoft.com/office/drawing/2014/main" id="{9668F6DA-134C-CEFE-A25B-00C6B8DBFC35}"/>
+              </a:ext>
+            </a:extLst>
+          </p:cNvPr>
+          <p:cNvSpPr txBox="1"/>
+          <p:nvPr/>
+        </p:nvSpPr>
+        <p:spPr>
+          <a:xfrm>
+            <a:off x="758173" y="4186872"/>
+            <a:ext cx="1247456" cy="461665"/>
+          </a:xfrm>
+          <a:prstGeom prst="rect">
+            <a:avLst/>
+          </a:prstGeom>
+          <a:noFill/>
+        </p:spPr>
+        <p:txBody>
+          <a:bodyPr wrap="square" rtlCol="0">
             <a:spAutoFit/>
           </a:bodyPr>
           <a:lstStyle/>
@@ -5316,7 +5107,7 @@
                 </a:solidFill>
                 <a:hlinkClick r:id="rId4"/>
               </a:rPr>
-              <a:t>Grupo 2</a:t>
+              <a:t>Grupo 3</a:t>
             </a:r>
             <a:endParaRPr lang="pt-BR" sz="2400" dirty="0">
               <a:solidFill>
@@ -5326,300 +5117,6 @@
           </a:p>
         </p:txBody>
       </p:sp>
-      <p:sp>
-        <p:nvSpPr>
-          <p:cNvPr id="17" name="Subtitle 2">
-            <a:extLst>
-              <a:ext uri="{FF2B5EF4-FFF2-40B4-BE49-F238E27FC236}">
-                <a16:creationId xmlns:a16="http://schemas.microsoft.com/office/drawing/2014/main" id="{4A54931A-A1BA-4082-E568-0FA1202D6A70}"/>
-              </a:ext>
-            </a:extLst>
-          </p:cNvPr>
-          <p:cNvSpPr txBox="1">
-            <a:spLocks/>
-          </p:cNvSpPr>
-          <p:nvPr/>
-        </p:nvSpPr>
-        <p:spPr>
-          <a:xfrm>
-            <a:off x="3124912" y="1493920"/>
-            <a:ext cx="2622176" cy="1320708"/>
-          </a:xfrm>
-          <a:prstGeom prst="rect">
-            <a:avLst/>
-          </a:prstGeom>
-          <a:solidFill>
-            <a:srgbClr val="E4E8EB"/>
-          </a:solidFill>
-        </p:spPr>
-        <p:txBody>
-          <a:bodyPr vert="horz" lIns="91440" tIns="216000" rIns="91440" bIns="45720" rtlCol="0">
-            <a:normAutofit/>
-          </a:bodyPr>
-          <a:lstStyle>
-            <a:lvl1pPr marL="0" indent="0" algn="ctr" defTabSz="914400" rtl="0" eaLnBrk="1" latinLnBrk="0" hangingPunct="1">
-              <a:lnSpc>
-                <a:spcPct val="90000"/>
-              </a:lnSpc>
-              <a:spcBef>
-                <a:spcPts val="1000"/>
-              </a:spcBef>
-              <a:buFont typeface="Arial" panose="020B0604020202020204" pitchFamily="34" charset="0"/>
-              <a:buNone/>
-              <a:defRPr sz="2400" kern="1200">
-                <a:solidFill>
-                  <a:schemeClr val="tx1"/>
-                </a:solidFill>
-                <a:latin typeface="+mn-lt"/>
-                <a:ea typeface="+mn-ea"/>
-                <a:cs typeface="+mn-cs"/>
-              </a:defRPr>
-            </a:lvl1pPr>
-            <a:lvl2pPr marL="457200" indent="0" algn="ctr" defTabSz="914400" rtl="0" eaLnBrk="1" latinLnBrk="0" hangingPunct="1">
-              <a:lnSpc>
-                <a:spcPct val="90000"/>
-              </a:lnSpc>
-              <a:spcBef>
-                <a:spcPts val="500"/>
-              </a:spcBef>
-              <a:buFont typeface="Arial" panose="020B0604020202020204" pitchFamily="34" charset="0"/>
-              <a:buNone/>
-              <a:defRPr sz="2000" kern="1200">
-                <a:solidFill>
-                  <a:schemeClr val="tx1"/>
-                </a:solidFill>
-                <a:latin typeface="+mn-lt"/>
-                <a:ea typeface="+mn-ea"/>
-                <a:cs typeface="+mn-cs"/>
-              </a:defRPr>
-            </a:lvl2pPr>
-            <a:lvl3pPr marL="914400" indent="0" algn="ctr" defTabSz="914400" rtl="0" eaLnBrk="1" latinLnBrk="0" hangingPunct="1">
-              <a:lnSpc>
-                <a:spcPct val="90000"/>
-              </a:lnSpc>
-              <a:spcBef>
-                <a:spcPts val="500"/>
-              </a:spcBef>
-              <a:buFont typeface="Arial" panose="020B0604020202020204" pitchFamily="34" charset="0"/>
-              <a:buNone/>
-              <a:defRPr sz="1800" kern="1200">
-                <a:solidFill>
-                  <a:schemeClr val="tx1"/>
-                </a:solidFill>
-                <a:latin typeface="+mn-lt"/>
-                <a:ea typeface="+mn-ea"/>
-                <a:cs typeface="+mn-cs"/>
-              </a:defRPr>
-            </a:lvl3pPr>
-            <a:lvl4pPr marL="1371600" indent="0" algn="ctr" defTabSz="914400" rtl="0" eaLnBrk="1" latinLnBrk="0" hangingPunct="1">
-              <a:lnSpc>
-                <a:spcPct val="90000"/>
-              </a:lnSpc>
-              <a:spcBef>
-                <a:spcPts val="500"/>
-              </a:spcBef>
-              <a:buFont typeface="Arial" panose="020B0604020202020204" pitchFamily="34" charset="0"/>
-              <a:buNone/>
-              <a:defRPr sz="1600" kern="1200">
-                <a:solidFill>
-                  <a:schemeClr val="tx1"/>
-                </a:solidFill>
-                <a:latin typeface="+mn-lt"/>
-                <a:ea typeface="+mn-ea"/>
-                <a:cs typeface="+mn-cs"/>
-              </a:defRPr>
-            </a:lvl4pPr>
-            <a:lvl5pPr marL="1828800" indent="0" algn="ctr" defTabSz="914400" rtl="0" eaLnBrk="1" latinLnBrk="0" hangingPunct="1">
-              <a:lnSpc>
-                <a:spcPct val="90000"/>
-              </a:lnSpc>
-              <a:spcBef>
-                <a:spcPts val="500"/>
-              </a:spcBef>
-              <a:buFont typeface="Arial" panose="020B0604020202020204" pitchFamily="34" charset="0"/>
-              <a:buNone/>
-              <a:defRPr sz="1600" kern="1200">
-                <a:solidFill>
-                  <a:schemeClr val="tx1"/>
-                </a:solidFill>
-                <a:latin typeface="+mn-lt"/>
-                <a:ea typeface="+mn-ea"/>
-                <a:cs typeface="+mn-cs"/>
-              </a:defRPr>
-            </a:lvl5pPr>
-            <a:lvl6pPr marL="2286000" indent="0" algn="ctr" defTabSz="914400" rtl="0" eaLnBrk="1" latinLnBrk="0" hangingPunct="1">
-              <a:lnSpc>
-                <a:spcPct val="90000"/>
-              </a:lnSpc>
-              <a:spcBef>
-                <a:spcPts val="500"/>
-              </a:spcBef>
-              <a:buFont typeface="Arial" panose="020B0604020202020204" pitchFamily="34" charset="0"/>
-              <a:buNone/>
-              <a:defRPr sz="1600" kern="1200">
-                <a:solidFill>
-                  <a:schemeClr val="tx1"/>
-                </a:solidFill>
-                <a:latin typeface="+mn-lt"/>
-                <a:ea typeface="+mn-ea"/>
-                <a:cs typeface="+mn-cs"/>
-              </a:defRPr>
-            </a:lvl6pPr>
-            <a:lvl7pPr marL="2743200" indent="0" algn="ctr" defTabSz="914400" rtl="0" eaLnBrk="1" latinLnBrk="0" hangingPunct="1">
-              <a:lnSpc>
-                <a:spcPct val="90000"/>
-              </a:lnSpc>
-              <a:spcBef>
-                <a:spcPts val="500"/>
-              </a:spcBef>
-              <a:buFont typeface="Arial" panose="020B0604020202020204" pitchFamily="34" charset="0"/>
-              <a:buNone/>
-              <a:defRPr sz="1600" kern="1200">
-                <a:solidFill>
-                  <a:schemeClr val="tx1"/>
-                </a:solidFill>
-                <a:latin typeface="+mn-lt"/>
-                <a:ea typeface="+mn-ea"/>
-                <a:cs typeface="+mn-cs"/>
-              </a:defRPr>
-            </a:lvl7pPr>
-            <a:lvl8pPr marL="3200400" indent="0" algn="ctr" defTabSz="914400" rtl="0" eaLnBrk="1" latinLnBrk="0" hangingPunct="1">
-              <a:lnSpc>
-                <a:spcPct val="90000"/>
-              </a:lnSpc>
-              <a:spcBef>
-                <a:spcPts val="500"/>
-              </a:spcBef>
-              <a:buFont typeface="Arial" panose="020B0604020202020204" pitchFamily="34" charset="0"/>
-              <a:buNone/>
-              <a:defRPr sz="1600" kern="1200">
-                <a:solidFill>
-                  <a:schemeClr val="tx1"/>
-                </a:solidFill>
-                <a:latin typeface="+mn-lt"/>
-                <a:ea typeface="+mn-ea"/>
-                <a:cs typeface="+mn-cs"/>
-              </a:defRPr>
-            </a:lvl8pPr>
-            <a:lvl9pPr marL="3657600" indent="0" algn="ctr" defTabSz="914400" rtl="0" eaLnBrk="1" latinLnBrk="0" hangingPunct="1">
-              <a:lnSpc>
-                <a:spcPct val="90000"/>
-              </a:lnSpc>
-              <a:spcBef>
-                <a:spcPts val="500"/>
-              </a:spcBef>
-              <a:buFont typeface="Arial" panose="020B0604020202020204" pitchFamily="34" charset="0"/>
-              <a:buNone/>
-              <a:defRPr sz="1600" kern="1200">
-                <a:solidFill>
-                  <a:schemeClr val="tx1"/>
-                </a:solidFill>
-                <a:latin typeface="+mn-lt"/>
-                <a:ea typeface="+mn-ea"/>
-                <a:cs typeface="+mn-cs"/>
-              </a:defRPr>
-            </a:lvl9pPr>
-          </a:lstStyle>
-          <a:p>
-            <a:r>
-              <a:rPr lang="pt-BR" dirty="0">
-                <a:solidFill>
-                  <a:srgbClr val="E1507D"/>
-                </a:solidFill>
-              </a:rPr>
-              <a:t>2023.2</a:t>
-            </a:r>
-          </a:p>
-        </p:txBody>
-      </p:sp>
-      <p:sp>
-        <p:nvSpPr>
-          <p:cNvPr id="26" name="TextBox 25">
-            <a:extLst>
-              <a:ext uri="{FF2B5EF4-FFF2-40B4-BE49-F238E27FC236}">
-                <a16:creationId xmlns:a16="http://schemas.microsoft.com/office/drawing/2014/main" id="{9668F6DA-134C-CEFE-A25B-00C6B8DBFC35}"/>
-              </a:ext>
-            </a:extLst>
-          </p:cNvPr>
-          <p:cNvSpPr txBox="1"/>
-          <p:nvPr/>
-        </p:nvSpPr>
-        <p:spPr>
-          <a:xfrm>
-            <a:off x="3398608" y="3304786"/>
-            <a:ext cx="1247457" cy="461665"/>
-          </a:xfrm>
-          <a:prstGeom prst="rect">
-            <a:avLst/>
-          </a:prstGeom>
-          <a:noFill/>
-        </p:spPr>
-        <p:txBody>
-          <a:bodyPr wrap="none" rtlCol="0">
-            <a:spAutoFit/>
-          </a:bodyPr>
-          <a:lstStyle/>
-          <a:p>
-            <a:r>
-              <a:rPr lang="pt-BR" sz="2400" dirty="0">
-                <a:solidFill>
-                  <a:srgbClr val="0D1F2D"/>
-                </a:solidFill>
-                <a:hlinkClick r:id="rId5"/>
-              </a:rPr>
-              <a:t>Grupo 1</a:t>
-            </a:r>
-            <a:endParaRPr lang="pt-BR" sz="2400" dirty="0">
-              <a:solidFill>
-                <a:srgbClr val="0D1F2D"/>
-              </a:solidFill>
-            </a:endParaRPr>
-          </a:p>
-        </p:txBody>
-      </p:sp>
-      <p:cxnSp>
-        <p:nvCxnSpPr>
-          <p:cNvPr id="37" name="Straight Connector 36">
-            <a:extLst>
-              <a:ext uri="{FF2B5EF4-FFF2-40B4-BE49-F238E27FC236}">
-                <a16:creationId xmlns:a16="http://schemas.microsoft.com/office/drawing/2014/main" id="{915E9EFA-F563-C57B-4870-11CC1892311D}"/>
-              </a:ext>
-            </a:extLst>
-          </p:cNvPr>
-          <p:cNvCxnSpPr>
-            <a:cxnSpLocks/>
-          </p:cNvCxnSpPr>
-          <p:nvPr/>
-        </p:nvCxnSpPr>
-        <p:spPr>
-          <a:xfrm>
-            <a:off x="3114339" y="1614274"/>
-            <a:ext cx="0" cy="1080000"/>
-          </a:xfrm>
-          <a:prstGeom prst="line">
-            <a:avLst/>
-          </a:prstGeom>
-          <a:ln w="57150">
-            <a:solidFill>
-              <a:srgbClr val="F2F6F6"/>
-            </a:solidFill>
-          </a:ln>
-        </p:spPr>
-        <p:style>
-          <a:lnRef idx="2">
-            <a:schemeClr val="accent1"/>
-          </a:lnRef>
-          <a:fillRef idx="0">
-            <a:schemeClr val="accent1"/>
-          </a:fillRef>
-          <a:effectRef idx="1">
-            <a:schemeClr val="accent1"/>
-          </a:effectRef>
-          <a:fontRef idx="minor">
-            <a:schemeClr val="tx1"/>
-          </a:fontRef>
-        </p:style>
-      </p:cxnSp>
     </p:spTree>
     <p:extLst>
       <p:ext uri="{BB962C8B-B14F-4D97-AF65-F5344CB8AC3E}">

</xml_diff>